<commit_message>
Updated Concepts for Client
</commit_message>
<xml_diff>
--- a/Documents/Fermata - Concepts for Client.pptx
+++ b/Documents/Fermata - Concepts for Client.pptx
@@ -2304,6 +2304,53 @@
           <a:chExt cx="0" cy="0"/>
         </a:xfrm>
       </p:grpSpPr>
+      <p:pic>
+        <p:nvPicPr>
+          <p:cNvPr id="1026" name="Picture 2" descr="Image result for fermata symbol">
+            <a:extLst>
+              <a:ext uri="{FF2B5EF4-FFF2-40B4-BE49-F238E27FC236}">
+                <a16:creationId xmlns:a16="http://schemas.microsoft.com/office/drawing/2014/main" id="{0C68B391-B7BA-423E-BEA7-5E8B197E1451}"/>
+              </a:ext>
+            </a:extLst>
+          </p:cNvPr>
+          <p:cNvPicPr>
+            <a:picLocks noChangeAspect="1" noChangeArrowheads="1"/>
+          </p:cNvPicPr>
+          <p:nvPr/>
+        </p:nvPicPr>
+        <p:blipFill>
+          <a:blip r:embed="rId3" cstate="print">
+            <a:extLst>
+              <a:ext uri="{28A0092B-C50C-407E-A947-70E740481C1C}">
+                <a14:useLocalDpi xmlns:a14="http://schemas.microsoft.com/office/drawing/2010/main" val="0"/>
+              </a:ext>
+            </a:extLst>
+          </a:blip>
+          <a:srcRect/>
+          <a:stretch>
+            <a:fillRect/>
+          </a:stretch>
+        </p:blipFill>
+        <p:spPr bwMode="auto">
+          <a:xfrm>
+            <a:off x="4416174" y="394282"/>
+            <a:ext cx="7491941" cy="5299394"/>
+          </a:xfrm>
+          <a:prstGeom prst="rect">
+            <a:avLst/>
+          </a:prstGeom>
+          <a:noFill/>
+          <a:extLst>
+            <a:ext uri="{909E8E84-426E-40DD-AFC4-6F175D3DCCD1}">
+              <a14:hiddenFill xmlns:a14="http://schemas.microsoft.com/office/drawing/2010/main">
+                <a:solidFill>
+                  <a:srgbClr val="FFFFFF"/>
+                </a:solidFill>
+              </a14:hiddenFill>
+            </a:ext>
+          </a:extLst>
+        </p:spPr>
+      </p:pic>
       <p:sp>
         <p:nvSpPr>
           <p:cNvPr id="2" name="Title 1"/>
@@ -2332,7 +2379,7 @@
                   <a:schemeClr val="bg1"/>
                 </a:solidFill>
               </a:rPr>
-              <a:t>Concepts for Client</a:t>
+              <a:t>Concepts for Client – Shell Osborne</a:t>
             </a:r>
           </a:p>
         </p:txBody>
@@ -2473,31 +2520,329 @@
           <a:p>
             <a:r>
               <a:rPr lang="en-AU" dirty="0"/>
-              <a:t>Strength/weaknesses/likes/dislikes stuff</a:t>
+              <a:t>Team Members</a:t>
             </a:r>
           </a:p>
         </p:txBody>
       </p:sp>
       <p:sp>
         <p:nvSpPr>
-          <p:cNvPr id="3" name="Content Placeholder 2">
+          <p:cNvPr id="4" name="TextBox 3">
             <a:extLst>
               <a:ext uri="{FF2B5EF4-FFF2-40B4-BE49-F238E27FC236}">
-                <a16:creationId xmlns:a16="http://schemas.microsoft.com/office/drawing/2014/main" id="{981FD9F4-F1AB-4BDB-845C-9896A0EC3B39}"/>
+                <a16:creationId xmlns:a16="http://schemas.microsoft.com/office/drawing/2014/main" id="{90032CB1-F241-4985-8B42-E19258E881A3}"/>
               </a:ext>
             </a:extLst>
           </p:cNvPr>
-          <p:cNvSpPr>
-            <a:spLocks noGrp="1"/>
-          </p:cNvSpPr>
-          <p:nvPr>
-            <p:ph sz="quarter" idx="10"/>
-          </p:nvPr>
+          <p:cNvSpPr txBox="1"/>
+          <p:nvPr/>
         </p:nvSpPr>
-        <p:spPr/>
+        <p:spPr>
+          <a:xfrm>
+            <a:off x="657726" y="1668379"/>
+            <a:ext cx="4299285" cy="5078313"/>
+          </a:xfrm>
+          <a:prstGeom prst="rect">
+            <a:avLst/>
+          </a:prstGeom>
+          <a:noFill/>
+        </p:spPr>
         <p:txBody>
-          <a:bodyPr/>
+          <a:bodyPr wrap="square" rtlCol="0">
+            <a:spAutoFit/>
+          </a:bodyPr>
           <a:lstStyle/>
+          <a:p>
+            <a:r>
+              <a:rPr lang="en-AU" u="sng" dirty="0" err="1"/>
+              <a:t>Glittika</a:t>
+            </a:r>
+            <a:r>
+              <a:rPr lang="en-AU" u="sng" dirty="0"/>
+              <a:t> </a:t>
+            </a:r>
+            <a:r>
+              <a:rPr lang="en-AU" u="sng" dirty="0" err="1"/>
+              <a:t>Gerdmanee</a:t>
+            </a:r>
+            <a:r>
+              <a:rPr lang="en-AU" u="sng" dirty="0"/>
+              <a:t> (Nancy) - Designer</a:t>
+            </a:r>
+            <a:endParaRPr lang="en-AU" dirty="0"/>
+          </a:p>
+          <a:p>
+            <a:r>
+              <a:rPr lang="en-AU" b="1" dirty="0"/>
+              <a:t>Strengths:</a:t>
+            </a:r>
+            <a:endParaRPr lang="en-AU" dirty="0"/>
+          </a:p>
+          <a:p>
+            <a:pPr lvl="0"/>
+            <a:r>
+              <a:rPr lang="en-AU" dirty="0"/>
+              <a:t>Narrative Design</a:t>
+            </a:r>
+          </a:p>
+          <a:p>
+            <a:pPr lvl="0"/>
+            <a:r>
+              <a:rPr lang="en-AU" dirty="0"/>
+              <a:t>2D Digital Art</a:t>
+            </a:r>
+          </a:p>
+          <a:p>
+            <a:pPr lvl="0"/>
+            <a:r>
+              <a:rPr lang="en-AU" dirty="0"/>
+              <a:t>Concepting</a:t>
+            </a:r>
+          </a:p>
+          <a:p>
+            <a:r>
+              <a:rPr lang="en-AU" b="1" dirty="0"/>
+              <a:t>Weaknesses:</a:t>
+            </a:r>
+            <a:endParaRPr lang="en-AU" dirty="0"/>
+          </a:p>
+          <a:p>
+            <a:pPr lvl="0"/>
+            <a:r>
+              <a:rPr lang="en-AU" dirty="0"/>
+              <a:t>Horror Concepts</a:t>
+            </a:r>
+          </a:p>
+          <a:p>
+            <a:pPr lvl="0"/>
+            <a:r>
+              <a:rPr lang="en-AU" dirty="0"/>
+              <a:t>Scripting (Coding)</a:t>
+            </a:r>
+          </a:p>
+          <a:p>
+            <a:endParaRPr lang="en-AU" u="sng" dirty="0"/>
+          </a:p>
+          <a:p>
+            <a:r>
+              <a:rPr lang="en-AU" u="sng" dirty="0"/>
+              <a:t>Wing Him Choi - Artist</a:t>
+            </a:r>
+            <a:endParaRPr lang="en-AU" dirty="0"/>
+          </a:p>
+          <a:p>
+            <a:r>
+              <a:rPr lang="en-AU" b="1" dirty="0"/>
+              <a:t>Strengths:</a:t>
+            </a:r>
+            <a:endParaRPr lang="en-AU" dirty="0"/>
+          </a:p>
+          <a:p>
+            <a:pPr lvl="0"/>
+            <a:r>
+              <a:rPr lang="en-AU" dirty="0"/>
+              <a:t>Rigging</a:t>
+            </a:r>
+          </a:p>
+          <a:p>
+            <a:pPr lvl="0"/>
+            <a:r>
+              <a:rPr lang="en-AU" dirty="0"/>
+              <a:t>Animation</a:t>
+            </a:r>
+          </a:p>
+          <a:p>
+            <a:pPr lvl="0"/>
+            <a:r>
+              <a:rPr lang="en-AU" dirty="0"/>
+              <a:t>Creature </a:t>
+            </a:r>
+            <a:r>
+              <a:rPr lang="en-AU" dirty="0" err="1"/>
+              <a:t>Modeling</a:t>
+            </a:r>
+            <a:endParaRPr lang="en-AU" dirty="0"/>
+          </a:p>
+          <a:p>
+            <a:r>
+              <a:rPr lang="en-AU" b="1" dirty="0"/>
+              <a:t>Weaknesses:</a:t>
+            </a:r>
+            <a:endParaRPr lang="en-AU" dirty="0"/>
+          </a:p>
+          <a:p>
+            <a:pPr lvl="0"/>
+            <a:r>
+              <a:rPr lang="en-AU" dirty="0"/>
+              <a:t>2D Art</a:t>
+            </a:r>
+          </a:p>
+          <a:p>
+            <a:pPr lvl="0"/>
+            <a:r>
+              <a:rPr lang="en-AU" dirty="0"/>
+              <a:t>Retopology</a:t>
+            </a:r>
+          </a:p>
+          <a:p>
+            <a:endParaRPr lang="en-AU" dirty="0"/>
+          </a:p>
+        </p:txBody>
+      </p:sp>
+      <p:sp>
+        <p:nvSpPr>
+          <p:cNvPr id="5" name="TextBox 4">
+            <a:extLst>
+              <a:ext uri="{FF2B5EF4-FFF2-40B4-BE49-F238E27FC236}">
+                <a16:creationId xmlns:a16="http://schemas.microsoft.com/office/drawing/2014/main" id="{B29A7C3F-694E-4B76-A426-3F776083D8D9}"/>
+              </a:ext>
+            </a:extLst>
+          </p:cNvPr>
+          <p:cNvSpPr txBox="1"/>
+          <p:nvPr/>
+        </p:nvSpPr>
+        <p:spPr>
+          <a:xfrm>
+            <a:off x="5550568" y="1668379"/>
+            <a:ext cx="5999748" cy="4801314"/>
+          </a:xfrm>
+          <a:prstGeom prst="rect">
+            <a:avLst/>
+          </a:prstGeom>
+          <a:noFill/>
+        </p:spPr>
+        <p:txBody>
+          <a:bodyPr wrap="square" rtlCol="0">
+            <a:spAutoFit/>
+          </a:bodyPr>
+          <a:lstStyle/>
+          <a:p>
+            <a:r>
+              <a:rPr lang="en-AU" u="sng" dirty="0"/>
+              <a:t>Tiarna </a:t>
+            </a:r>
+            <a:r>
+              <a:rPr lang="en-AU" u="sng" dirty="0" err="1"/>
+              <a:t>Kilmister</a:t>
+            </a:r>
+            <a:r>
+              <a:rPr lang="en-AU" u="sng" dirty="0"/>
+              <a:t> - Artist</a:t>
+            </a:r>
+            <a:endParaRPr lang="en-AU" dirty="0"/>
+          </a:p>
+          <a:p>
+            <a:r>
+              <a:rPr lang="en-AU" b="1" dirty="0"/>
+              <a:t>Strengths:</a:t>
+            </a:r>
+            <a:endParaRPr lang="en-AU" dirty="0"/>
+          </a:p>
+          <a:p>
+            <a:pPr lvl="0"/>
+            <a:r>
+              <a:rPr lang="en-AU" dirty="0"/>
+              <a:t>Character </a:t>
+            </a:r>
+            <a:r>
+              <a:rPr lang="en-AU" dirty="0" err="1"/>
+              <a:t>Modeling</a:t>
+            </a:r>
+            <a:endParaRPr lang="en-AU" dirty="0"/>
+          </a:p>
+          <a:p>
+            <a:pPr lvl="0"/>
+            <a:r>
+              <a:rPr lang="en-AU" dirty="0" err="1"/>
+              <a:t>ZBrush</a:t>
+            </a:r>
+            <a:endParaRPr lang="en-AU" dirty="0"/>
+          </a:p>
+          <a:p>
+            <a:pPr lvl="0"/>
+            <a:r>
+              <a:rPr lang="en-AU" dirty="0"/>
+              <a:t>Texturing</a:t>
+            </a:r>
+          </a:p>
+          <a:p>
+            <a:r>
+              <a:rPr lang="en-AU" b="1" dirty="0"/>
+              <a:t>Weaknesses:</a:t>
+            </a:r>
+            <a:endParaRPr lang="en-AU" dirty="0"/>
+          </a:p>
+          <a:p>
+            <a:pPr lvl="0"/>
+            <a:r>
+              <a:rPr lang="en-AU" dirty="0"/>
+              <a:t>Skinning</a:t>
+            </a:r>
+          </a:p>
+          <a:p>
+            <a:pPr lvl="0"/>
+            <a:r>
+              <a:rPr lang="en-AU" dirty="0"/>
+              <a:t>Hard surface </a:t>
+            </a:r>
+            <a:r>
+              <a:rPr lang="en-AU" dirty="0" err="1"/>
+              <a:t>modeling</a:t>
+            </a:r>
+            <a:endParaRPr lang="en-AU" dirty="0"/>
+          </a:p>
+          <a:p>
+            <a:endParaRPr lang="en-AU" u="sng" dirty="0"/>
+          </a:p>
+          <a:p>
+            <a:r>
+              <a:rPr lang="en-AU" u="sng" dirty="0"/>
+              <a:t>Finn Perry - Programmer</a:t>
+            </a:r>
+            <a:endParaRPr lang="en-AU" dirty="0"/>
+          </a:p>
+          <a:p>
+            <a:r>
+              <a:rPr lang="en-AU" b="1" dirty="0"/>
+              <a:t>Strengths:</a:t>
+            </a:r>
+            <a:endParaRPr lang="en-AU" dirty="0"/>
+          </a:p>
+          <a:p>
+            <a:pPr lvl="0"/>
+            <a:r>
+              <a:rPr lang="en-AU" dirty="0"/>
+              <a:t>Back-End Systems</a:t>
+            </a:r>
+          </a:p>
+          <a:p>
+            <a:pPr lvl="0"/>
+            <a:r>
+              <a:rPr lang="en-AU" dirty="0"/>
+              <a:t>Tools</a:t>
+            </a:r>
+          </a:p>
+          <a:p>
+            <a:r>
+              <a:rPr lang="en-AU" b="1" dirty="0"/>
+              <a:t>Weaknesses:</a:t>
+            </a:r>
+            <a:endParaRPr lang="en-AU" dirty="0"/>
+          </a:p>
+          <a:p>
+            <a:pPr lvl="0"/>
+            <a:r>
+              <a:rPr lang="en-AU" dirty="0"/>
+              <a:t>Programming for Front End</a:t>
+            </a:r>
+          </a:p>
+          <a:p>
+            <a:pPr lvl="0"/>
+            <a:r>
+              <a:rPr lang="en-AU" dirty="0"/>
+              <a:t>Gameplay</a:t>
+            </a:r>
+          </a:p>
           <a:p>
             <a:endParaRPr lang="en-AU" dirty="0"/>
           </a:p>
@@ -2895,6 +3240,53 @@
           <a:chExt cx="0" cy="0"/>
         </a:xfrm>
       </p:grpSpPr>
+      <p:pic>
+        <p:nvPicPr>
+          <p:cNvPr id="2050" name="Picture 2" descr="https://media.discordapp.net/attachments/484911970911387659/494853340727869490/babyDragons_roughthumbnails.png?width=918&amp;height=656">
+            <a:extLst>
+              <a:ext uri="{FF2B5EF4-FFF2-40B4-BE49-F238E27FC236}">
+                <a16:creationId xmlns:a16="http://schemas.microsoft.com/office/drawing/2014/main" id="{EE793972-3E43-47CC-8EBD-187C645D5840}"/>
+              </a:ext>
+            </a:extLst>
+          </p:cNvPr>
+          <p:cNvPicPr>
+            <a:picLocks noChangeAspect="1" noChangeArrowheads="1"/>
+          </p:cNvPicPr>
+          <p:nvPr/>
+        </p:nvPicPr>
+        <p:blipFill>
+          <a:blip r:embed="rId2">
+            <a:extLst>
+              <a:ext uri="{28A0092B-C50C-407E-A947-70E740481C1C}">
+                <a14:useLocalDpi xmlns:a14="http://schemas.microsoft.com/office/drawing/2010/main" val="0"/>
+              </a:ext>
+            </a:extLst>
+          </a:blip>
+          <a:srcRect/>
+          <a:stretch>
+            <a:fillRect/>
+          </a:stretch>
+        </p:blipFill>
+        <p:spPr bwMode="auto">
+          <a:xfrm>
+            <a:off x="7935984" y="3816665"/>
+            <a:ext cx="4256015" cy="3041335"/>
+          </a:xfrm>
+          <a:prstGeom prst="rect">
+            <a:avLst/>
+          </a:prstGeom>
+          <a:noFill/>
+          <a:extLst>
+            <a:ext uri="{909E8E84-426E-40DD-AFC4-6F175D3DCCD1}">
+              <a14:hiddenFill xmlns:a14="http://schemas.microsoft.com/office/drawing/2010/main">
+                <a:solidFill>
+                  <a:srgbClr val="FFFFFF"/>
+                </a:solidFill>
+              </a14:hiddenFill>
+            </a:ext>
+          </a:extLst>
+        </p:spPr>
+      </p:pic>
       <p:sp>
         <p:nvSpPr>
           <p:cNvPr id="8" name="Title 7"/>
@@ -2940,7 +3332,7 @@
         </p:nvSpPr>
         <p:spPr>
           <a:xfrm>
-            <a:off x="1395173" y="1796335"/>
+            <a:off x="521207" y="1812377"/>
             <a:ext cx="4416552" cy="3977640"/>
           </a:xfrm>
         </p:spPr>
@@ -2969,12 +3361,8 @@
           <a:p>
             <a:pPr marL="571500" lvl="1" indent="-342900"/>
             <a:r>
-              <a:rPr lang="en-AU" sz="2400" dirty="0">
-                <a:highlight>
-                  <a:srgbClr val="FFFF00"/>
-                </a:highlight>
-              </a:rPr>
-              <a:t>Colourful World</a:t>
+              <a:rPr lang="en-AU" sz="2400" dirty="0"/>
+              <a:t>Vibrant, adorable visuals</a:t>
             </a:r>
           </a:p>
           <a:p>
@@ -3239,7 +3627,7 @@
         </p:nvSpPr>
         <p:spPr>
           <a:xfrm>
-            <a:off x="5811725" y="1807968"/>
+            <a:off x="4937759" y="1824010"/>
             <a:ext cx="4416552" cy="3977640"/>
           </a:xfrm>
           <a:prstGeom prst="rect">
@@ -3467,13 +3855,6 @@
             <a:pPr marL="571500" lvl="1" indent="-342900"/>
             <a:r>
               <a:rPr lang="en-AU" sz="2400" dirty="0"/>
-              <a:t>Cute Colourful Dragons</a:t>
-            </a:r>
-          </a:p>
-          <a:p>
-            <a:pPr marL="571500" lvl="1" indent="-342900"/>
-            <a:r>
-              <a:rPr lang="en-AU" sz="2400" dirty="0"/>
               <a:t>Trove of Power-Ups</a:t>
             </a:r>
           </a:p>
@@ -3483,6 +3864,24 @@
               <a:rPr lang="en-AU" sz="2400" dirty="0"/>
               <a:t>Multiple Arenas</a:t>
             </a:r>
+          </a:p>
+          <a:p>
+            <a:pPr marL="571500" lvl="1" indent="-342900"/>
+            <a:r>
+              <a:rPr lang="en-AU" sz="2400" dirty="0"/>
+              <a:t>Cute Colourful </a:t>
+            </a:r>
+            <a:br>
+              <a:rPr lang="en-AU" sz="2400" dirty="0"/>
+            </a:br>
+            <a:r>
+              <a:rPr lang="en-AU" sz="2400" dirty="0"/>
+              <a:t>Dragons</a:t>
+            </a:r>
+          </a:p>
+          <a:p>
+            <a:pPr marL="571500" lvl="1" indent="-342900"/>
+            <a:endParaRPr lang="en-AU" sz="2400" dirty="0"/>
           </a:p>
         </p:txBody>
       </p:sp>
@@ -3777,12 +4176,73 @@
               <a:defRPr/>
             </a:pPr>
             <a:r>
-              <a:rPr lang="en-AU" sz="2800" dirty="0"/>
-              <a:t>-</a:t>
-            </a:r>
-            <a:endParaRPr lang="en-US" sz="4400" dirty="0">
-              <a:cs typeface="Segoe UI" panose="020B0502040204020203" pitchFamily="34" charset="0"/>
-            </a:endParaRPr>
+              <a:rPr lang="en-AU" sz="2800" dirty="0">
+                <a:cs typeface="Segoe UI" panose="020B0502040204020203" pitchFamily="34" charset="0"/>
+              </a:rPr>
+              <a:t>Play your heart out and fight for the spotlight for your time to shine with the instrument of your choice!</a:t>
+            </a:r>
+          </a:p>
+          <a:p>
+            <a:pPr lvl="1">
+              <a:lnSpc>
+                <a:spcPct val="100000"/>
+              </a:lnSpc>
+              <a:spcAft>
+                <a:spcPts val="600"/>
+              </a:spcAft>
+              <a:defRPr/>
+            </a:pPr>
+            <a:r>
+              <a:rPr lang="en-US" sz="2400" dirty="0">
+                <a:cs typeface="Segoe UI" panose="020B0502040204020203" pitchFamily="34" charset="0"/>
+              </a:rPr>
+              <a:t>2-4 Players</a:t>
+            </a:r>
+          </a:p>
+          <a:p>
+            <a:pPr lvl="1">
+              <a:lnSpc>
+                <a:spcPct val="100000"/>
+              </a:lnSpc>
+              <a:spcAft>
+                <a:spcPts val="600"/>
+              </a:spcAft>
+              <a:defRPr/>
+            </a:pPr>
+            <a:r>
+              <a:rPr lang="en-AU" sz="2400" dirty="0"/>
+              <a:t>Premium (Single Purchase)</a:t>
+            </a:r>
+          </a:p>
+          <a:p>
+            <a:pPr lvl="1">
+              <a:lnSpc>
+                <a:spcPct val="100000"/>
+              </a:lnSpc>
+              <a:spcAft>
+                <a:spcPts val="600"/>
+              </a:spcAft>
+              <a:defRPr/>
+            </a:pPr>
+            <a:r>
+              <a:rPr lang="en-AU" sz="2400" dirty="0"/>
+              <a:t>PC</a:t>
+            </a:r>
+          </a:p>
+          <a:p>
+            <a:pPr lvl="1">
+              <a:lnSpc>
+                <a:spcPct val="100000"/>
+              </a:lnSpc>
+              <a:spcAft>
+                <a:spcPts val="600"/>
+              </a:spcAft>
+              <a:defRPr/>
+            </a:pPr>
+            <a:r>
+              <a:rPr lang="en-AU" sz="2400" dirty="0"/>
+              <a:t>Casual players</a:t>
+            </a:r>
           </a:p>
         </p:txBody>
       </p:sp>
@@ -3890,7 +4350,24 @@
           </a:p>
           <a:p>
             <a:pPr marL="571500" lvl="1" indent="-342900"/>
-            <a:endParaRPr lang="en-AU" sz="2400" dirty="0"/>
+            <a:r>
+              <a:rPr lang="en-AU" sz="2400" dirty="0"/>
+              <a:t>Fast-paced Competitive Action</a:t>
+            </a:r>
+          </a:p>
+          <a:p>
+            <a:pPr marL="571500" lvl="1" indent="-342900"/>
+            <a:r>
+              <a:rPr lang="en-AU" sz="2400" dirty="0"/>
+              <a:t>Master Multiple Stages</a:t>
+            </a:r>
+          </a:p>
+          <a:p>
+            <a:pPr marL="571500" lvl="1" indent="-342900"/>
+            <a:r>
+              <a:rPr lang="en-AU" sz="2400" dirty="0"/>
+              <a:t>Part-Rhythm gameplay</a:t>
+            </a:r>
           </a:p>
           <a:p>
             <a:pPr marL="571500" lvl="1" indent="-342900"/>
@@ -4365,6 +4842,27 @@
             <a:r>
               <a:rPr lang="en-AU" sz="2400" b="1" dirty="0"/>
               <a:t>Key Features</a:t>
+            </a:r>
+          </a:p>
+          <a:p>
+            <a:pPr marL="571500" lvl="1" indent="-342900"/>
+            <a:r>
+              <a:rPr lang="en-AU" sz="2400" dirty="0"/>
+              <a:t>Cutesy Cartoon Instruments</a:t>
+            </a:r>
+          </a:p>
+          <a:p>
+            <a:pPr marL="571500" lvl="1" indent="-342900"/>
+            <a:r>
+              <a:rPr lang="en-AU" sz="2400" dirty="0"/>
+              <a:t>Amazing Soundtrack</a:t>
+            </a:r>
+          </a:p>
+          <a:p>
+            <a:pPr marL="571500" lvl="1" indent="-342900"/>
+            <a:r>
+              <a:rPr lang="en-AU" sz="2400" dirty="0"/>
+              <a:t>Unique Powers</a:t>
             </a:r>
           </a:p>
         </p:txBody>
@@ -4660,12 +5158,73 @@
               <a:defRPr/>
             </a:pPr>
             <a:r>
-              <a:rPr lang="en-AU" sz="2800" dirty="0"/>
-              <a:t>-</a:t>
-            </a:r>
-            <a:endParaRPr lang="en-US" sz="4400" dirty="0">
-              <a:cs typeface="Segoe UI" panose="020B0502040204020203" pitchFamily="34" charset="0"/>
-            </a:endParaRPr>
+              <a:rPr lang="en-AU" sz="2800" dirty="0">
+                <a:cs typeface="Segoe UI" panose="020B0502040204020203" pitchFamily="34" charset="0"/>
+              </a:rPr>
+              <a:t>Play as an unfortunate fellow with a detonator inside them, stuck in a room with a bomb that will explode if they get too close.</a:t>
+            </a:r>
+          </a:p>
+          <a:p>
+            <a:pPr lvl="1">
+              <a:lnSpc>
+                <a:spcPct val="100000"/>
+              </a:lnSpc>
+              <a:spcAft>
+                <a:spcPts val="600"/>
+              </a:spcAft>
+              <a:defRPr/>
+            </a:pPr>
+            <a:r>
+              <a:rPr lang="en-US" sz="2400" dirty="0">
+                <a:cs typeface="Segoe UI" panose="020B0502040204020203" pitchFamily="34" charset="0"/>
+              </a:rPr>
+              <a:t>1 Player</a:t>
+            </a:r>
+          </a:p>
+          <a:p>
+            <a:pPr lvl="1">
+              <a:lnSpc>
+                <a:spcPct val="100000"/>
+              </a:lnSpc>
+              <a:spcAft>
+                <a:spcPts val="600"/>
+              </a:spcAft>
+              <a:defRPr/>
+            </a:pPr>
+            <a:r>
+              <a:rPr lang="en-AU" sz="2400" dirty="0"/>
+              <a:t>Premium (Single Purchase)</a:t>
+            </a:r>
+          </a:p>
+          <a:p>
+            <a:pPr lvl="1">
+              <a:lnSpc>
+                <a:spcPct val="100000"/>
+              </a:lnSpc>
+              <a:spcAft>
+                <a:spcPts val="600"/>
+              </a:spcAft>
+              <a:defRPr/>
+            </a:pPr>
+            <a:r>
+              <a:rPr lang="en-AU" sz="2400" dirty="0"/>
+              <a:t>PC</a:t>
+            </a:r>
+          </a:p>
+          <a:p>
+            <a:pPr lvl="1">
+              <a:lnSpc>
+                <a:spcPct val="100000"/>
+              </a:lnSpc>
+              <a:spcAft>
+                <a:spcPts val="600"/>
+              </a:spcAft>
+              <a:defRPr/>
+            </a:pPr>
+            <a:r>
+              <a:rPr lang="en-AU" sz="2400" dirty="0"/>
+              <a:t>Fans of puzzle games</a:t>
+            </a:r>
           </a:p>
         </p:txBody>
       </p:sp>
@@ -4773,6 +5332,27 @@
           </a:p>
           <a:p>
             <a:pPr marL="571500" lvl="1" indent="-342900"/>
+            <a:r>
+              <a:rPr lang="en-AU" sz="2400" dirty="0"/>
+              <a:t>Escape Room Puzzles</a:t>
+            </a:r>
+          </a:p>
+          <a:p>
+            <a:pPr marL="571500" lvl="1" indent="-342900"/>
+            <a:r>
+              <a:rPr lang="en-AU" sz="2400" dirty="0"/>
+              <a:t>Two Options for Victory</a:t>
+            </a:r>
+          </a:p>
+          <a:p>
+            <a:pPr marL="571500" lvl="1" indent="-342900"/>
+            <a:r>
+              <a:rPr lang="en-AU" sz="2400" dirty="0"/>
+              <a:t>Tense Atmosphere</a:t>
+            </a:r>
+          </a:p>
+          <a:p>
+            <a:pPr marL="571500" lvl="1" indent="-342900"/>
             <a:endParaRPr lang="en-AU" sz="2400" dirty="0"/>
           </a:p>
           <a:p>
@@ -5248,6 +5828,20 @@
             <a:r>
               <a:rPr lang="en-AU" sz="2400" b="1" dirty="0"/>
               <a:t>Key Features</a:t>
+            </a:r>
+          </a:p>
+          <a:p>
+            <a:pPr marL="571500" lvl="1" indent="-342900"/>
+            <a:r>
+              <a:rPr lang="en-AU" sz="2400" dirty="0"/>
+              <a:t>Cartoony Graphics</a:t>
+            </a:r>
+          </a:p>
+          <a:p>
+            <a:pPr marL="571500" lvl="1" indent="-342900"/>
+            <a:r>
+              <a:rPr lang="en-AU" sz="2400" dirty="0"/>
+              <a:t>Bomb Changes Location</a:t>
             </a:r>
           </a:p>
         </p:txBody>

</xml_diff>